<commit_message>
Update undoredo sequence diagram
</commit_message>
<xml_diff>
--- a/docs/diagrams/UndoRedoSequenceDiagram.pptx
+++ b/docs/diagrams/UndoRedoSequenceDiagram.pptx
@@ -126,10 +126,6 @@
 </p:presentation>
 </file>
 
-<file path=ppt/revisionInfo.xml><?xml version="1.0" encoding="utf-8"?>
-<p1510:revInfo xmlns:a="http://schemas.openxmlformats.org/drawingml/2006/main" xmlns:r="http://schemas.openxmlformats.org/officeDocument/2006/relationships" xmlns:p1510="http://schemas.microsoft.com/office/powerpoint/2015/10/main"/>
-</file>
-
 <file path=ppt/notesMasters/notesMaster1.xml><?xml version="1.0" encoding="utf-8"?>
 <p:notesMaster xmlns:a="http://schemas.openxmlformats.org/drawingml/2006/main" xmlns:r="http://schemas.openxmlformats.org/officeDocument/2006/relationships" xmlns:p="http://schemas.openxmlformats.org/presentationml/2006/main">
   <p:cSld>
@@ -212,7 +208,7 @@
           <a:p>
             <a:fld id="{F5CC4B3F-88C1-4FFA-B1B6-F41C21DC6924}" type="datetimeFigureOut">
               <a:rPr lang="en-US" smtClean="0"/>
-              <a:t>7/6/2018</a:t>
+              <a:t>11/12/18</a:t>
             </a:fld>
             <a:endParaRPr lang="en-US"/>
           </a:p>
@@ -658,7 +654,7 @@
           <a:p>
             <a:fld id="{78C97017-6FC3-485B-9764-EAC9E56C1D49}" type="datetimeFigureOut">
               <a:rPr lang="en-US" smtClean="0"/>
-              <a:t>7/6/2018</a:t>
+              <a:t>11/12/18</a:t>
             </a:fld>
             <a:endParaRPr lang="en-US"/>
           </a:p>
@@ -826,7 +822,7 @@
           <a:p>
             <a:fld id="{78C97017-6FC3-485B-9764-EAC9E56C1D49}" type="datetimeFigureOut">
               <a:rPr lang="en-US" smtClean="0"/>
-              <a:t>7/6/2018</a:t>
+              <a:t>11/12/18</a:t>
             </a:fld>
             <a:endParaRPr lang="en-US"/>
           </a:p>
@@ -1004,7 +1000,7 @@
           <a:p>
             <a:fld id="{78C97017-6FC3-485B-9764-EAC9E56C1D49}" type="datetimeFigureOut">
               <a:rPr lang="en-US" smtClean="0"/>
-              <a:t>7/6/2018</a:t>
+              <a:t>11/12/18</a:t>
             </a:fld>
             <a:endParaRPr lang="en-US"/>
           </a:p>
@@ -1172,7 +1168,7 @@
           <a:p>
             <a:fld id="{78C97017-6FC3-485B-9764-EAC9E56C1D49}" type="datetimeFigureOut">
               <a:rPr lang="en-US" smtClean="0"/>
-              <a:t>7/6/2018</a:t>
+              <a:t>11/12/18</a:t>
             </a:fld>
             <a:endParaRPr lang="en-US"/>
           </a:p>
@@ -1417,7 +1413,7 @@
           <a:p>
             <a:fld id="{78C97017-6FC3-485B-9764-EAC9E56C1D49}" type="datetimeFigureOut">
               <a:rPr lang="en-US" smtClean="0"/>
-              <a:t>7/6/2018</a:t>
+              <a:t>11/12/18</a:t>
             </a:fld>
             <a:endParaRPr lang="en-US"/>
           </a:p>
@@ -1702,7 +1698,7 @@
           <a:p>
             <a:fld id="{78C97017-6FC3-485B-9764-EAC9E56C1D49}" type="datetimeFigureOut">
               <a:rPr lang="en-US" smtClean="0"/>
-              <a:t>7/6/2018</a:t>
+              <a:t>11/12/18</a:t>
             </a:fld>
             <a:endParaRPr lang="en-US"/>
           </a:p>
@@ -2121,7 +2117,7 @@
           <a:p>
             <a:fld id="{78C97017-6FC3-485B-9764-EAC9E56C1D49}" type="datetimeFigureOut">
               <a:rPr lang="en-US" smtClean="0"/>
-              <a:t>7/6/2018</a:t>
+              <a:t>11/12/18</a:t>
             </a:fld>
             <a:endParaRPr lang="en-US"/>
           </a:p>
@@ -2238,7 +2234,7 @@
           <a:p>
             <a:fld id="{78C97017-6FC3-485B-9764-EAC9E56C1D49}" type="datetimeFigureOut">
               <a:rPr lang="en-US" smtClean="0"/>
-              <a:t>7/6/2018</a:t>
+              <a:t>11/12/18</a:t>
             </a:fld>
             <a:endParaRPr lang="en-US"/>
           </a:p>
@@ -2333,7 +2329,7 @@
           <a:p>
             <a:fld id="{78C97017-6FC3-485B-9764-EAC9E56C1D49}" type="datetimeFigureOut">
               <a:rPr lang="en-US" smtClean="0"/>
-              <a:t>7/6/2018</a:t>
+              <a:t>11/12/18</a:t>
             </a:fld>
             <a:endParaRPr lang="en-US"/>
           </a:p>
@@ -2608,7 +2604,7 @@
           <a:p>
             <a:fld id="{78C97017-6FC3-485B-9764-EAC9E56C1D49}" type="datetimeFigureOut">
               <a:rPr lang="en-US" smtClean="0"/>
-              <a:t>7/6/2018</a:t>
+              <a:t>11/12/18</a:t>
             </a:fld>
             <a:endParaRPr lang="en-US"/>
           </a:p>
@@ -2860,7 +2856,7 @@
           <a:p>
             <a:fld id="{78C97017-6FC3-485B-9764-EAC9E56C1D49}" type="datetimeFigureOut">
               <a:rPr lang="en-US" smtClean="0"/>
-              <a:t>7/6/2018</a:t>
+              <a:t>11/12/18</a:t>
             </a:fld>
             <a:endParaRPr lang="en-US"/>
           </a:p>
@@ -3071,7 +3067,7 @@
           <a:p>
             <a:fld id="{78C97017-6FC3-485B-9764-EAC9E56C1D49}" type="datetimeFigureOut">
               <a:rPr lang="en-US" smtClean="0"/>
-              <a:t>7/6/2018</a:t>
+              <a:t>11/12/18</a:t>
             </a:fld>
             <a:endParaRPr lang="en-US"/>
           </a:p>
@@ -4286,8 +4282,8 @@
         </p:nvSpPr>
         <p:spPr>
           <a:xfrm>
-            <a:off x="5651548" y="2748246"/>
-            <a:ext cx="1298078" cy="184666"/>
+            <a:off x="5529009" y="2755731"/>
+            <a:ext cx="1405191" cy="161583"/>
           </a:xfrm>
           <a:prstGeom prst="rect">
             <a:avLst/>
@@ -4312,7 +4308,7 @@
           </a:lstStyle>
           <a:p>
             <a:r>
-              <a:rPr lang="en-US" sz="1200" dirty="0" err="1">
+              <a:rPr lang="en-US" sz="1050" dirty="0" err="1">
                 <a:solidFill>
                   <a:schemeClr val="accent4">
                     <a:lumMod val="75000"/>
@@ -4322,7 +4318,7 @@
               <a:t>undo</a:t>
             </a:r>
             <a:r>
-              <a:rPr lang="en-US" sz="1200" dirty="0" err="1">
+              <a:rPr lang="en-US" sz="1050" dirty="0" err="1">
                 <a:solidFill>
                   <a:srgbClr val="7030A0"/>
                 </a:solidFill>
@@ -4330,14 +4326,14 @@
               <a:t>AddressBook</a:t>
             </a:r>
             <a:r>
-              <a:rPr lang="en-US" sz="1200" dirty="0">
+              <a:rPr lang="en-US" sz="1050" dirty="0">
                 <a:solidFill>
                   <a:srgbClr val="7030A0"/>
                 </a:solidFill>
               </a:rPr>
               <a:t>()</a:t>
             </a:r>
-            <a:endParaRPr lang="en-US" sz="1200" dirty="0"/>
+            <a:endParaRPr lang="en-US" sz="1050" dirty="0"/>
           </a:p>
         </p:txBody>
       </p:sp>
@@ -5057,8 +5053,8 @@
         </p:nvSpPr>
         <p:spPr>
           <a:xfrm>
-            <a:off x="8769530" y="3267337"/>
-            <a:ext cx="2120786" cy="184666"/>
+            <a:off x="8370579" y="2996773"/>
+            <a:ext cx="2983221" cy="184666"/>
           </a:xfrm>
           <a:prstGeom prst="rect">
             <a:avLst/>
@@ -5220,45 +5216,6 @@
           </a:p>
         </p:txBody>
       </p:sp>
-      <p:cxnSp>
-        <p:nvCxnSpPr>
-          <p:cNvPr id="13" name="Curved Connector 12"/>
-          <p:cNvCxnSpPr/>
-          <p:nvPr/>
-        </p:nvCxnSpPr>
-        <p:spPr>
-          <a:xfrm rot="16200000" flipH="1">
-            <a:off x="8527578" y="3220579"/>
-            <a:ext cx="156923" cy="76200"/>
-          </a:xfrm>
-          <a:prstGeom prst="curvedConnector4">
-            <a:avLst>
-              <a:gd name="adj1" fmla="val -145677"/>
-              <a:gd name="adj2" fmla="val 400000"/>
-            </a:avLst>
-          </a:prstGeom>
-          <a:ln>
-            <a:solidFill>
-              <a:srgbClr val="7030A0"/>
-            </a:solidFill>
-            <a:tailEnd type="triangle"/>
-          </a:ln>
-        </p:spPr>
-        <p:style>
-          <a:lnRef idx="1">
-            <a:schemeClr val="accent1"/>
-          </a:lnRef>
-          <a:fillRef idx="0">
-            <a:schemeClr val="accent1"/>
-          </a:fillRef>
-          <a:effectRef idx="0">
-            <a:schemeClr val="accent1"/>
-          </a:effectRef>
-          <a:fontRef idx="minor">
-            <a:schemeClr val="tx1"/>
-          </a:fontRef>
-        </p:style>
-      </p:cxnSp>
       <p:cxnSp>
         <p:nvCxnSpPr>
           <p:cNvPr id="52" name="Straight Arrow Connector 51"/>
@@ -5313,7 +5270,7 @@
         </p:nvCxnSpPr>
         <p:spPr>
           <a:xfrm flipV="1">
-            <a:off x="7043991" y="3564914"/>
+            <a:off x="7043991" y="3575075"/>
             <a:ext cx="1470216" cy="6325"/>
           </a:xfrm>
           <a:prstGeom prst="straightConnector1">
@@ -5373,6 +5330,154 @@
             <a:prstDash val="sysDash"/>
             <a:headEnd type="arrow" w="med" len="med"/>
             <a:tailEnd type="none" w="med" len="med"/>
+          </a:ln>
+        </p:spPr>
+        <p:style>
+          <a:lnRef idx="1">
+            <a:schemeClr val="accent1"/>
+          </a:lnRef>
+          <a:fillRef idx="0">
+            <a:schemeClr val="accent1"/>
+          </a:fillRef>
+          <a:effectRef idx="0">
+            <a:schemeClr val="accent1"/>
+          </a:effectRef>
+          <a:fontRef idx="minor">
+            <a:schemeClr val="tx1"/>
+          </a:fontRef>
+        </p:style>
+      </p:cxnSp>
+      <p:sp>
+        <p:nvSpPr>
+          <p:cNvPr id="43" name="Rectangle 42">
+            <a:extLst>
+              <a:ext uri="{FF2B5EF4-FFF2-40B4-BE49-F238E27FC236}">
+                <a16:creationId xmlns:a16="http://schemas.microsoft.com/office/drawing/2014/main" id="{F1D42920-DBB6-1047-A93F-C09DEC5774DB}"/>
+              </a:ext>
+            </a:extLst>
+          </p:cNvPr>
+          <p:cNvSpPr/>
+          <p:nvPr/>
+        </p:nvSpPr>
+        <p:spPr>
+          <a:xfrm>
+            <a:off x="8606039" y="3258679"/>
+            <a:ext cx="125390" cy="193324"/>
+          </a:xfrm>
+          <a:prstGeom prst="rect">
+            <a:avLst/>
+          </a:prstGeom>
+          <a:solidFill>
+            <a:srgbClr val="7030A0"/>
+          </a:solidFill>
+          <a:ln>
+            <a:solidFill>
+              <a:schemeClr val="bg1"/>
+            </a:solidFill>
+          </a:ln>
+          <a:effectLst/>
+        </p:spPr>
+        <p:style>
+          <a:lnRef idx="1">
+            <a:schemeClr val="accent3"/>
+          </a:lnRef>
+          <a:fillRef idx="2">
+            <a:schemeClr val="accent3"/>
+          </a:fillRef>
+          <a:effectRef idx="1">
+            <a:schemeClr val="accent3"/>
+          </a:effectRef>
+          <a:fontRef idx="minor">
+            <a:schemeClr val="dk1"/>
+          </a:fontRef>
+        </p:style>
+        <p:txBody>
+          <a:bodyPr rtlCol="0" anchor="ctr"/>
+          <a:lstStyle/>
+          <a:p>
+            <a:pPr algn="ctr"/>
+            <a:endParaRPr lang="en-SG" sz="1400"/>
+          </a:p>
+        </p:txBody>
+      </p:sp>
+      <p:cxnSp>
+        <p:nvCxnSpPr>
+          <p:cNvPr id="22" name="Curved Connector 21">
+            <a:extLst>
+              <a:ext uri="{FF2B5EF4-FFF2-40B4-BE49-F238E27FC236}">
+                <a16:creationId xmlns:a16="http://schemas.microsoft.com/office/drawing/2014/main" id="{8A41EAB5-2FC7-BD48-A058-01CB7366DF9B}"/>
+              </a:ext>
+            </a:extLst>
+          </p:cNvPr>
+          <p:cNvCxnSpPr>
+            <a:cxnSpLocks/>
+            <a:stCxn id="86" idx="0"/>
+          </p:cNvCxnSpPr>
+          <p:nvPr/>
+        </p:nvCxnSpPr>
+        <p:spPr>
+          <a:xfrm rot="16200000" flipH="1">
+            <a:off x="8593380" y="3168633"/>
+            <a:ext cx="123843" cy="152257"/>
+          </a:xfrm>
+          <a:prstGeom prst="curvedConnector4">
+            <a:avLst>
+              <a:gd name="adj1" fmla="val -184589"/>
+              <a:gd name="adj2" fmla="val 186827"/>
+            </a:avLst>
+          </a:prstGeom>
+          <a:ln>
+            <a:solidFill>
+              <a:srgbClr val="66389A"/>
+            </a:solidFill>
+            <a:tailEnd type="triangle"/>
+          </a:ln>
+        </p:spPr>
+        <p:style>
+          <a:lnRef idx="1">
+            <a:schemeClr val="accent1"/>
+          </a:lnRef>
+          <a:fillRef idx="0">
+            <a:schemeClr val="accent1"/>
+          </a:fillRef>
+          <a:effectRef idx="0">
+            <a:schemeClr val="accent1"/>
+          </a:effectRef>
+          <a:fontRef idx="minor">
+            <a:schemeClr val="tx1"/>
+          </a:fontRef>
+        </p:style>
+      </p:cxnSp>
+      <p:cxnSp>
+        <p:nvCxnSpPr>
+          <p:cNvPr id="44" name="Curved Connector 43">
+            <a:extLst>
+              <a:ext uri="{FF2B5EF4-FFF2-40B4-BE49-F238E27FC236}">
+                <a16:creationId xmlns:a16="http://schemas.microsoft.com/office/drawing/2014/main" id="{7F0B0F4D-7823-7349-ADD1-FA949F1006FB}"/>
+              </a:ext>
+            </a:extLst>
+          </p:cNvPr>
+          <p:cNvCxnSpPr>
+            <a:cxnSpLocks/>
+          </p:cNvCxnSpPr>
+          <p:nvPr/>
+        </p:nvCxnSpPr>
+        <p:spPr>
+          <a:xfrm rot="5400000">
+            <a:off x="8638184" y="3469126"/>
+            <a:ext cx="110368" cy="76122"/>
+          </a:xfrm>
+          <a:prstGeom prst="curvedConnector3">
+            <a:avLst>
+              <a:gd name="adj1" fmla="val 145596"/>
+            </a:avLst>
+          </a:prstGeom>
+          <a:ln>
+            <a:solidFill>
+              <a:srgbClr val="66389A"/>
+            </a:solidFill>
+            <a:prstDash val="sysDash"/>
+            <a:tailEnd type="triangle"/>
           </a:ln>
         </p:spPr>
         <p:style>

</xml_diff>